<commit_message>
Updated key rotation image
</commit_message>
<xml_diff>
--- a/rotate-storage-account-keys/images/KeyRotation.pptx
+++ b/rotate-storage-account-keys/images/KeyRotation.pptx
@@ -7,6 +7,7 @@
   <p:sldIdLst>
     <p:sldId id="256" r:id="rId2"/>
     <p:sldId id="257" r:id="rId3"/>
+    <p:sldId id="258" r:id="rId4"/>
   </p:sldIdLst>
   <p:sldSz cx="12192000" cy="6858000"/>
   <p:notesSz cx="6858000" cy="9144000"/>
@@ -273,7 +274,7 @@
           <a:p>
             <a:fld id="{204CB59D-0B44-44F3-B5A9-A7D5250B1D1A}" type="datetimeFigureOut">
               <a:rPr lang="en-GB" smtClean="0"/>
-              <a:t>06/09/2021</a:t>
+              <a:t>07/09/2021</a:t>
             </a:fld>
             <a:endParaRPr lang="en-GB"/>
           </a:p>
@@ -473,7 +474,7 @@
           <a:p>
             <a:fld id="{204CB59D-0B44-44F3-B5A9-A7D5250B1D1A}" type="datetimeFigureOut">
               <a:rPr lang="en-GB" smtClean="0"/>
-              <a:t>06/09/2021</a:t>
+              <a:t>07/09/2021</a:t>
             </a:fld>
             <a:endParaRPr lang="en-GB"/>
           </a:p>
@@ -683,7 +684,7 @@
           <a:p>
             <a:fld id="{204CB59D-0B44-44F3-B5A9-A7D5250B1D1A}" type="datetimeFigureOut">
               <a:rPr lang="en-GB" smtClean="0"/>
-              <a:t>06/09/2021</a:t>
+              <a:t>07/09/2021</a:t>
             </a:fld>
             <a:endParaRPr lang="en-GB"/>
           </a:p>
@@ -883,7 +884,7 @@
           <a:p>
             <a:fld id="{204CB59D-0B44-44F3-B5A9-A7D5250B1D1A}" type="datetimeFigureOut">
               <a:rPr lang="en-GB" smtClean="0"/>
-              <a:t>06/09/2021</a:t>
+              <a:t>07/09/2021</a:t>
             </a:fld>
             <a:endParaRPr lang="en-GB"/>
           </a:p>
@@ -1159,7 +1160,7 @@
           <a:p>
             <a:fld id="{204CB59D-0B44-44F3-B5A9-A7D5250B1D1A}" type="datetimeFigureOut">
               <a:rPr lang="en-GB" smtClean="0"/>
-              <a:t>06/09/2021</a:t>
+              <a:t>07/09/2021</a:t>
             </a:fld>
             <a:endParaRPr lang="en-GB"/>
           </a:p>
@@ -1427,7 +1428,7 @@
           <a:p>
             <a:fld id="{204CB59D-0B44-44F3-B5A9-A7D5250B1D1A}" type="datetimeFigureOut">
               <a:rPr lang="en-GB" smtClean="0"/>
-              <a:t>06/09/2021</a:t>
+              <a:t>07/09/2021</a:t>
             </a:fld>
             <a:endParaRPr lang="en-GB"/>
           </a:p>
@@ -1842,7 +1843,7 @@
           <a:p>
             <a:fld id="{204CB59D-0B44-44F3-B5A9-A7D5250B1D1A}" type="datetimeFigureOut">
               <a:rPr lang="en-GB" smtClean="0"/>
-              <a:t>06/09/2021</a:t>
+              <a:t>07/09/2021</a:t>
             </a:fld>
             <a:endParaRPr lang="en-GB"/>
           </a:p>
@@ -1984,7 +1985,7 @@
           <a:p>
             <a:fld id="{204CB59D-0B44-44F3-B5A9-A7D5250B1D1A}" type="datetimeFigureOut">
               <a:rPr lang="en-GB" smtClean="0"/>
-              <a:t>06/09/2021</a:t>
+              <a:t>07/09/2021</a:t>
             </a:fld>
             <a:endParaRPr lang="en-GB"/>
           </a:p>
@@ -2097,7 +2098,7 @@
           <a:p>
             <a:fld id="{204CB59D-0B44-44F3-B5A9-A7D5250B1D1A}" type="datetimeFigureOut">
               <a:rPr lang="en-GB" smtClean="0"/>
-              <a:t>06/09/2021</a:t>
+              <a:t>07/09/2021</a:t>
             </a:fld>
             <a:endParaRPr lang="en-GB"/>
           </a:p>
@@ -2410,7 +2411,7 @@
           <a:p>
             <a:fld id="{204CB59D-0B44-44F3-B5A9-A7D5250B1D1A}" type="datetimeFigureOut">
               <a:rPr lang="en-GB" smtClean="0"/>
-              <a:t>06/09/2021</a:t>
+              <a:t>07/09/2021</a:t>
             </a:fld>
             <a:endParaRPr lang="en-GB"/>
           </a:p>
@@ -2699,7 +2700,7 @@
           <a:p>
             <a:fld id="{204CB59D-0B44-44F3-B5A9-A7D5250B1D1A}" type="datetimeFigureOut">
               <a:rPr lang="en-GB" smtClean="0"/>
-              <a:t>06/09/2021</a:t>
+              <a:t>07/09/2021</a:t>
             </a:fld>
             <a:endParaRPr lang="en-GB"/>
           </a:p>
@@ -2942,7 +2943,7 @@
           <a:p>
             <a:fld id="{204CB59D-0B44-44F3-B5A9-A7D5250B1D1A}" type="datetimeFigureOut">
               <a:rPr lang="en-GB" smtClean="0"/>
-              <a:t>06/09/2021</a:t>
+              <a:t>07/09/2021</a:t>
             </a:fld>
             <a:endParaRPr lang="en-GB"/>
           </a:p>
@@ -5345,6 +5346,1132 @@
 </p:sld>
 </file>
 
+<file path=ppt/slides/slide3.xml><?xml version="1.0" encoding="utf-8"?>
+<p:sld xmlns:a="http://schemas.openxmlformats.org/drawingml/2006/main" xmlns:r="http://schemas.openxmlformats.org/officeDocument/2006/relationships" xmlns:p="http://schemas.openxmlformats.org/presentationml/2006/main">
+  <p:cSld>
+    <p:spTree>
+      <p:nvGrpSpPr>
+        <p:cNvPr id="1" name=""/>
+        <p:cNvGrpSpPr/>
+        <p:nvPr/>
+      </p:nvGrpSpPr>
+      <p:grpSpPr>
+        <a:xfrm>
+          <a:off x="0" y="0"/>
+          <a:ext cx="0" cy="0"/>
+          <a:chOff x="0" y="0"/>
+          <a:chExt cx="0" cy="0"/>
+        </a:xfrm>
+      </p:grpSpPr>
+      <p:sp>
+        <p:nvSpPr>
+          <p:cNvPr id="4" name="Flowchart: Terminator 3">
+            <a:extLst>
+              <a:ext uri="{FF2B5EF4-FFF2-40B4-BE49-F238E27FC236}">
+                <a16:creationId xmlns:a16="http://schemas.microsoft.com/office/drawing/2014/main" id="{2E22D97D-655F-48FD-B881-CF7A3D622473}"/>
+              </a:ext>
+            </a:extLst>
+          </p:cNvPr>
+          <p:cNvSpPr/>
+          <p:nvPr/>
+        </p:nvSpPr>
+        <p:spPr>
+          <a:xfrm>
+            <a:off x="168676" y="806863"/>
+            <a:ext cx="1171852" cy="372862"/>
+          </a:xfrm>
+          <a:prstGeom prst="flowChartTerminator">
+            <a:avLst/>
+          </a:prstGeom>
+        </p:spPr>
+        <p:style>
+          <a:lnRef idx="2">
+            <a:schemeClr val="accent1">
+              <a:shade val="50000"/>
+            </a:schemeClr>
+          </a:lnRef>
+          <a:fillRef idx="1">
+            <a:schemeClr val="accent1"/>
+          </a:fillRef>
+          <a:effectRef idx="0">
+            <a:schemeClr val="accent1"/>
+          </a:effectRef>
+          <a:fontRef idx="minor">
+            <a:schemeClr val="lt1"/>
+          </a:fontRef>
+        </p:style>
+        <p:txBody>
+          <a:bodyPr rtlCol="0" anchor="ctr"/>
+          <a:lstStyle/>
+          <a:p>
+            <a:pPr algn="ctr"/>
+            <a:r>
+              <a:rPr lang="en-GB" dirty="0"/>
+              <a:t>Start</a:t>
+            </a:r>
+          </a:p>
+        </p:txBody>
+      </p:sp>
+      <p:sp>
+        <p:nvSpPr>
+          <p:cNvPr id="5" name="Flowchart: Terminator 4">
+            <a:extLst>
+              <a:ext uri="{FF2B5EF4-FFF2-40B4-BE49-F238E27FC236}">
+                <a16:creationId xmlns:a16="http://schemas.microsoft.com/office/drawing/2014/main" id="{E620D17C-2332-4B85-9C21-537900995626}"/>
+              </a:ext>
+            </a:extLst>
+          </p:cNvPr>
+          <p:cNvSpPr/>
+          <p:nvPr/>
+        </p:nvSpPr>
+        <p:spPr>
+          <a:xfrm>
+            <a:off x="319595" y="5850384"/>
+            <a:ext cx="1047565" cy="790112"/>
+          </a:xfrm>
+          <a:prstGeom prst="flowChartTerminator">
+            <a:avLst/>
+          </a:prstGeom>
+        </p:spPr>
+        <p:style>
+          <a:lnRef idx="2">
+            <a:schemeClr val="accent1">
+              <a:shade val="50000"/>
+            </a:schemeClr>
+          </a:lnRef>
+          <a:fillRef idx="1">
+            <a:schemeClr val="accent1"/>
+          </a:fillRef>
+          <a:effectRef idx="0">
+            <a:schemeClr val="accent1"/>
+          </a:effectRef>
+          <a:fontRef idx="minor">
+            <a:schemeClr val="lt1"/>
+          </a:fontRef>
+        </p:style>
+        <p:txBody>
+          <a:bodyPr rtlCol="0" anchor="ctr"/>
+          <a:lstStyle/>
+          <a:p>
+            <a:pPr algn="ctr"/>
+            <a:r>
+              <a:rPr lang="en-GB" dirty="0"/>
+              <a:t>Next item in CSV</a:t>
+            </a:r>
+          </a:p>
+        </p:txBody>
+      </p:sp>
+      <p:sp>
+        <p:nvSpPr>
+          <p:cNvPr id="6" name="Flowchart: Process 5">
+            <a:extLst>
+              <a:ext uri="{FF2B5EF4-FFF2-40B4-BE49-F238E27FC236}">
+                <a16:creationId xmlns:a16="http://schemas.microsoft.com/office/drawing/2014/main" id="{BC7DC3C4-6550-43D7-98A3-EE77D80A0AA0}"/>
+              </a:ext>
+            </a:extLst>
+          </p:cNvPr>
+          <p:cNvSpPr/>
+          <p:nvPr/>
+        </p:nvSpPr>
+        <p:spPr>
+          <a:xfrm>
+            <a:off x="3009530" y="203182"/>
+            <a:ext cx="2849732" cy="790112"/>
+          </a:xfrm>
+          <a:prstGeom prst="flowChartProcess">
+            <a:avLst/>
+          </a:prstGeom>
+        </p:spPr>
+        <p:style>
+          <a:lnRef idx="2">
+            <a:schemeClr val="accent1">
+              <a:shade val="50000"/>
+            </a:schemeClr>
+          </a:lnRef>
+          <a:fillRef idx="1">
+            <a:schemeClr val="accent1"/>
+          </a:fillRef>
+          <a:effectRef idx="0">
+            <a:schemeClr val="accent1"/>
+          </a:effectRef>
+          <a:fontRef idx="minor">
+            <a:schemeClr val="lt1"/>
+          </a:fontRef>
+        </p:style>
+        <p:txBody>
+          <a:bodyPr rtlCol="0" anchor="ctr"/>
+          <a:lstStyle/>
+          <a:p>
+            <a:pPr algn="ctr"/>
+            <a:r>
+              <a:rPr lang="en-GB" dirty="0"/>
+              <a:t>Read list of storage accounts from CSV</a:t>
+            </a:r>
+          </a:p>
+        </p:txBody>
+      </p:sp>
+      <p:sp>
+        <p:nvSpPr>
+          <p:cNvPr id="7" name="Flowchart: Process 6">
+            <a:extLst>
+              <a:ext uri="{FF2B5EF4-FFF2-40B4-BE49-F238E27FC236}">
+                <a16:creationId xmlns:a16="http://schemas.microsoft.com/office/drawing/2014/main" id="{8F31EFC2-3097-40AA-87D1-04DB72BB0541}"/>
+              </a:ext>
+            </a:extLst>
+          </p:cNvPr>
+          <p:cNvSpPr/>
+          <p:nvPr/>
+        </p:nvSpPr>
+        <p:spPr>
+          <a:xfrm>
+            <a:off x="3009530" y="2714793"/>
+            <a:ext cx="5734976" cy="790112"/>
+          </a:xfrm>
+          <a:prstGeom prst="flowChartProcess">
+            <a:avLst/>
+          </a:prstGeom>
+        </p:spPr>
+        <p:style>
+          <a:lnRef idx="2">
+            <a:schemeClr val="accent1">
+              <a:shade val="50000"/>
+            </a:schemeClr>
+          </a:lnRef>
+          <a:fillRef idx="1">
+            <a:schemeClr val="accent1"/>
+          </a:fillRef>
+          <a:effectRef idx="0">
+            <a:schemeClr val="accent1"/>
+          </a:effectRef>
+          <a:fontRef idx="minor">
+            <a:schemeClr val="lt1"/>
+          </a:fontRef>
+        </p:style>
+        <p:txBody>
+          <a:bodyPr rtlCol="0" anchor="ctr"/>
+          <a:lstStyle/>
+          <a:p>
+            <a:pPr algn="ctr"/>
+            <a:r>
+              <a:rPr lang="en-GB" dirty="0"/>
+              <a:t>Get current value held in </a:t>
+            </a:r>
+            <a:r>
+              <a:rPr lang="en-GB" dirty="0" err="1"/>
+              <a:t>KeyVault</a:t>
+            </a:r>
+            <a:r>
+              <a:rPr lang="en-GB" dirty="0"/>
+              <a:t> ‘Storage001_key’</a:t>
+            </a:r>
+          </a:p>
+        </p:txBody>
+      </p:sp>
+      <p:pic>
+        <p:nvPicPr>
+          <p:cNvPr id="8" name="Graphic 7">
+            <a:extLst>
+              <a:ext uri="{FF2B5EF4-FFF2-40B4-BE49-F238E27FC236}">
+                <a16:creationId xmlns:a16="http://schemas.microsoft.com/office/drawing/2014/main" id="{D54587E2-F5A8-43EE-826E-171CB543FDE3}"/>
+              </a:ext>
+            </a:extLst>
+          </p:cNvPr>
+          <p:cNvPicPr>
+            <a:picLocks noChangeAspect="1"/>
+          </p:cNvPicPr>
+          <p:nvPr/>
+        </p:nvPicPr>
+        <p:blipFill>
+          <a:blip r:embed="rId2">
+            <a:extLst>
+              <a:ext uri="{28A0092B-C50C-407E-A947-70E740481C1C}">
+                <a14:useLocalDpi xmlns:a14="http://schemas.microsoft.com/office/drawing/2010/main" val="0"/>
+              </a:ext>
+              <a:ext uri="{96DAC541-7B7A-43D3-8B79-37D633B846F1}">
+                <asvg:svgBlip xmlns:asvg="http://schemas.microsoft.com/office/drawing/2016/SVG/main" r:embed="rId3"/>
+              </a:ext>
+            </a:extLst>
+          </a:blip>
+          <a:stretch>
+            <a:fillRect/>
+          </a:stretch>
+        </p:blipFill>
+        <p:spPr>
+          <a:xfrm>
+            <a:off x="10047405" y="3348256"/>
+            <a:ext cx="849242" cy="849242"/>
+          </a:xfrm>
+          <a:prstGeom prst="rect">
+            <a:avLst/>
+          </a:prstGeom>
+        </p:spPr>
+      </p:pic>
+      <p:sp>
+        <p:nvSpPr>
+          <p:cNvPr id="9" name="TextBox 8">
+            <a:extLst>
+              <a:ext uri="{FF2B5EF4-FFF2-40B4-BE49-F238E27FC236}">
+                <a16:creationId xmlns:a16="http://schemas.microsoft.com/office/drawing/2014/main" id="{4CBC5316-623F-4B3F-A69F-28BD8975A2E8}"/>
+              </a:ext>
+            </a:extLst>
+          </p:cNvPr>
+          <p:cNvSpPr txBox="1"/>
+          <p:nvPr/>
+        </p:nvSpPr>
+        <p:spPr>
+          <a:xfrm>
+            <a:off x="9917951" y="2901260"/>
+            <a:ext cx="1517989" cy="369332"/>
+          </a:xfrm>
+          <a:prstGeom prst="rect">
+            <a:avLst/>
+          </a:prstGeom>
+          <a:noFill/>
+        </p:spPr>
+        <p:txBody>
+          <a:bodyPr wrap="square" rtlCol="0">
+            <a:spAutoFit/>
+          </a:bodyPr>
+          <a:lstStyle/>
+          <a:p>
+            <a:r>
+              <a:rPr lang="en-GB" dirty="0"/>
+              <a:t>Key Vault</a:t>
+            </a:r>
+          </a:p>
+        </p:txBody>
+      </p:sp>
+      <p:graphicFrame>
+        <p:nvGraphicFramePr>
+          <p:cNvPr id="10" name="Table 10">
+            <a:extLst>
+              <a:ext uri="{FF2B5EF4-FFF2-40B4-BE49-F238E27FC236}">
+                <a16:creationId xmlns:a16="http://schemas.microsoft.com/office/drawing/2014/main" id="{27F9E1FA-75EF-4CDE-AFDD-2EA9DC66181D}"/>
+              </a:ext>
+            </a:extLst>
+          </p:cNvPr>
+          <p:cNvGraphicFramePr>
+            <a:graphicFrameLocks noGrp="1"/>
+          </p:cNvGraphicFramePr>
+          <p:nvPr>
+            <p:extLst>
+              <p:ext uri="{D42A27DB-BD31-4B8C-83A1-F6EECF244321}">
+                <p14:modId xmlns:p14="http://schemas.microsoft.com/office/powerpoint/2010/main" val="498248221"/>
+              </p:ext>
+            </p:extLst>
+          </p:nvPr>
+        </p:nvGraphicFramePr>
+        <p:xfrm>
+          <a:off x="3009530" y="1149644"/>
+          <a:ext cx="8886550" cy="945270"/>
+        </p:xfrm>
+        <a:graphic>
+          <a:graphicData uri="http://schemas.openxmlformats.org/drawingml/2006/table">
+            <a:tbl>
+              <a:tblPr firstRow="1" bandRow="1">
+                <a:tableStyleId>{5C22544A-7EE6-4342-B048-85BDC9FD1C3A}</a:tableStyleId>
+              </a:tblPr>
+              <a:tblGrid>
+                <a:gridCol w="639194">
+                  <a:extLst>
+                    <a:ext uri="{9D8B030D-6E8A-4147-A177-3AD203B41FA5}">
+                      <a16:colId xmlns:a16="http://schemas.microsoft.com/office/drawing/2014/main" val="2523509419"/>
+                    </a:ext>
+                  </a:extLst>
+                </a:gridCol>
+                <a:gridCol w="2405849">
+                  <a:extLst>
+                    <a:ext uri="{9D8B030D-6E8A-4147-A177-3AD203B41FA5}">
+                      <a16:colId xmlns:a16="http://schemas.microsoft.com/office/drawing/2014/main" val="3887948401"/>
+                    </a:ext>
+                  </a:extLst>
+                </a:gridCol>
+                <a:gridCol w="3293615">
+                  <a:extLst>
+                    <a:ext uri="{9D8B030D-6E8A-4147-A177-3AD203B41FA5}">
+                      <a16:colId xmlns:a16="http://schemas.microsoft.com/office/drawing/2014/main" val="1916528151"/>
+                    </a:ext>
+                  </a:extLst>
+                </a:gridCol>
+                <a:gridCol w="2547892">
+                  <a:extLst>
+                    <a:ext uri="{9D8B030D-6E8A-4147-A177-3AD203B41FA5}">
+                      <a16:colId xmlns:a16="http://schemas.microsoft.com/office/drawing/2014/main" val="26403898"/>
+                    </a:ext>
+                  </a:extLst>
+                </a:gridCol>
+              </a:tblGrid>
+              <a:tr h="256923">
+                <a:tc>
+                  <a:txBody>
+                    <a:bodyPr/>
+                    <a:lstStyle/>
+                    <a:p>
+                      <a:r>
+                        <a:rPr lang="en-GB" sz="1200" dirty="0"/>
+                        <a:t>s.no</a:t>
+                      </a:r>
+                    </a:p>
+                  </a:txBody>
+                  <a:tcPr/>
+                </a:tc>
+                <a:tc>
+                  <a:txBody>
+                    <a:bodyPr/>
+                    <a:lstStyle/>
+                    <a:p>
+                      <a:r>
+                        <a:rPr lang="en-GB" sz="1200" dirty="0"/>
+                        <a:t>Storage Account Name</a:t>
+                      </a:r>
+                    </a:p>
+                  </a:txBody>
+                  <a:tcPr/>
+                </a:tc>
+                <a:tc>
+                  <a:txBody>
+                    <a:bodyPr/>
+                    <a:lstStyle/>
+                    <a:p>
+                      <a:r>
+                        <a:rPr lang="en-GB" sz="1200" dirty="0"/>
+                        <a:t>Storage Account Resource Group</a:t>
+                      </a:r>
+                    </a:p>
+                  </a:txBody>
+                  <a:tcPr/>
+                </a:tc>
+                <a:tc>
+                  <a:txBody>
+                    <a:bodyPr/>
+                    <a:lstStyle/>
+                    <a:p>
+                      <a:r>
+                        <a:rPr lang="en-GB" sz="1200" dirty="0"/>
+                        <a:t>Key Vault Secret Name</a:t>
+                      </a:r>
+                    </a:p>
+                  </a:txBody>
+                  <a:tcPr/>
+                </a:tc>
+                <a:extLst>
+                  <a:ext uri="{0D108BD9-81ED-4DB2-BD59-A6C34878D82A}">
+                    <a16:rowId xmlns:a16="http://schemas.microsoft.com/office/drawing/2014/main" val="2199165214"/>
+                  </a:ext>
+                </a:extLst>
+              </a:tr>
+              <a:tr h="335475">
+                <a:tc>
+                  <a:txBody>
+                    <a:bodyPr/>
+                    <a:lstStyle/>
+                    <a:p>
+                      <a:r>
+                        <a:rPr lang="en-GB" sz="1200" dirty="0"/>
+                        <a:t>1</a:t>
+                      </a:r>
+                    </a:p>
+                  </a:txBody>
+                  <a:tcPr/>
+                </a:tc>
+                <a:tc>
+                  <a:txBody>
+                    <a:bodyPr/>
+                    <a:lstStyle/>
+                    <a:p>
+                      <a:r>
+                        <a:rPr lang="en-GB" sz="1200" dirty="0"/>
+                        <a:t>Storage001</a:t>
+                      </a:r>
+                    </a:p>
+                  </a:txBody>
+                  <a:tcPr/>
+                </a:tc>
+                <a:tc>
+                  <a:txBody>
+                    <a:bodyPr/>
+                    <a:lstStyle/>
+                    <a:p>
+                      <a:r>
+                        <a:rPr lang="en-GB" sz="1200" dirty="0"/>
+                        <a:t>Resourcegroup001</a:t>
+                      </a:r>
+                    </a:p>
+                  </a:txBody>
+                  <a:tcPr/>
+                </a:tc>
+                <a:tc>
+                  <a:txBody>
+                    <a:bodyPr/>
+                    <a:lstStyle/>
+                    <a:p>
+                      <a:r>
+                        <a:rPr lang="en-GB" sz="1200" dirty="0"/>
+                        <a:t>Storage001_Key</a:t>
+                      </a:r>
+                    </a:p>
+                  </a:txBody>
+                  <a:tcPr/>
+                </a:tc>
+                <a:extLst>
+                  <a:ext uri="{0D108BD9-81ED-4DB2-BD59-A6C34878D82A}">
+                    <a16:rowId xmlns:a16="http://schemas.microsoft.com/office/drawing/2014/main" val="1057612595"/>
+                  </a:ext>
+                </a:extLst>
+              </a:tr>
+              <a:tr h="335475">
+                <a:tc>
+                  <a:txBody>
+                    <a:bodyPr/>
+                    <a:lstStyle/>
+                    <a:p>
+                      <a:r>
+                        <a:rPr lang="en-GB" sz="1200" dirty="0"/>
+                        <a:t>2</a:t>
+                      </a:r>
+                    </a:p>
+                  </a:txBody>
+                  <a:tcPr/>
+                </a:tc>
+                <a:tc>
+                  <a:txBody>
+                    <a:bodyPr/>
+                    <a:lstStyle/>
+                    <a:p>
+                      <a:r>
+                        <a:rPr lang="en-GB" sz="1200" dirty="0"/>
+                        <a:t>Storage002</a:t>
+                      </a:r>
+                    </a:p>
+                  </a:txBody>
+                  <a:tcPr/>
+                </a:tc>
+                <a:tc>
+                  <a:txBody>
+                    <a:bodyPr/>
+                    <a:lstStyle/>
+                    <a:p>
+                      <a:r>
+                        <a:rPr lang="en-GB" sz="1200" dirty="0"/>
+                        <a:t>Resourcegroup002</a:t>
+                      </a:r>
+                    </a:p>
+                  </a:txBody>
+                  <a:tcPr/>
+                </a:tc>
+                <a:tc>
+                  <a:txBody>
+                    <a:bodyPr/>
+                    <a:lstStyle/>
+                    <a:p>
+                      <a:r>
+                        <a:rPr lang="en-GB" sz="1200" dirty="0"/>
+                        <a:t>Storage002_Key</a:t>
+                      </a:r>
+                    </a:p>
+                  </a:txBody>
+                  <a:tcPr/>
+                </a:tc>
+                <a:extLst>
+                  <a:ext uri="{0D108BD9-81ED-4DB2-BD59-A6C34878D82A}">
+                    <a16:rowId xmlns:a16="http://schemas.microsoft.com/office/drawing/2014/main" val="2759556694"/>
+                  </a:ext>
+                </a:extLst>
+              </a:tr>
+            </a:tbl>
+          </a:graphicData>
+        </a:graphic>
+      </p:graphicFrame>
+      <p:sp>
+        <p:nvSpPr>
+          <p:cNvPr id="11" name="Flowchart: Process 10">
+            <a:extLst>
+              <a:ext uri="{FF2B5EF4-FFF2-40B4-BE49-F238E27FC236}">
+                <a16:creationId xmlns:a16="http://schemas.microsoft.com/office/drawing/2014/main" id="{0AB991E0-C609-4600-B9C3-16ADF8687267}"/>
+              </a:ext>
+            </a:extLst>
+          </p:cNvPr>
+          <p:cNvSpPr/>
+          <p:nvPr/>
+        </p:nvSpPr>
+        <p:spPr>
+          <a:xfrm>
+            <a:off x="3009530" y="3776798"/>
+            <a:ext cx="5734977" cy="790112"/>
+          </a:xfrm>
+          <a:prstGeom prst="flowChartProcess">
+            <a:avLst/>
+          </a:prstGeom>
+        </p:spPr>
+        <p:style>
+          <a:lnRef idx="2">
+            <a:schemeClr val="accent1">
+              <a:shade val="50000"/>
+            </a:schemeClr>
+          </a:lnRef>
+          <a:fillRef idx="1">
+            <a:schemeClr val="accent1"/>
+          </a:fillRef>
+          <a:effectRef idx="0">
+            <a:schemeClr val="accent1"/>
+          </a:effectRef>
+          <a:fontRef idx="minor">
+            <a:schemeClr val="lt1"/>
+          </a:fontRef>
+        </p:style>
+        <p:txBody>
+          <a:bodyPr rtlCol="0" anchor="ctr"/>
+          <a:lstStyle/>
+          <a:p>
+            <a:pPr algn="ctr"/>
+            <a:r>
+              <a:rPr lang="en-GB" dirty="0"/>
+              <a:t>Get account keys from ‘Storage001’ (Key1,Key2)</a:t>
+            </a:r>
+          </a:p>
+        </p:txBody>
+      </p:sp>
+      <p:sp>
+        <p:nvSpPr>
+          <p:cNvPr id="12" name="Flowchart: Process 11">
+            <a:extLst>
+              <a:ext uri="{FF2B5EF4-FFF2-40B4-BE49-F238E27FC236}">
+                <a16:creationId xmlns:a16="http://schemas.microsoft.com/office/drawing/2014/main" id="{C556D095-7974-4E7D-90EB-8D4905BDF359}"/>
+              </a:ext>
+            </a:extLst>
+          </p:cNvPr>
+          <p:cNvSpPr/>
+          <p:nvPr/>
+        </p:nvSpPr>
+        <p:spPr>
+          <a:xfrm>
+            <a:off x="3009529" y="4780483"/>
+            <a:ext cx="5734977" cy="790112"/>
+          </a:xfrm>
+          <a:prstGeom prst="flowChartProcess">
+            <a:avLst/>
+          </a:prstGeom>
+        </p:spPr>
+        <p:style>
+          <a:lnRef idx="2">
+            <a:schemeClr val="accent1">
+              <a:shade val="50000"/>
+            </a:schemeClr>
+          </a:lnRef>
+          <a:fillRef idx="1">
+            <a:schemeClr val="accent1"/>
+          </a:fillRef>
+          <a:effectRef idx="0">
+            <a:schemeClr val="accent1"/>
+          </a:effectRef>
+          <a:fontRef idx="minor">
+            <a:schemeClr val="lt1"/>
+          </a:fontRef>
+        </p:style>
+        <p:txBody>
+          <a:bodyPr rtlCol="0" anchor="ctr"/>
+          <a:lstStyle/>
+          <a:p>
+            <a:pPr algn="ctr"/>
+            <a:r>
+              <a:rPr lang="en-GB" dirty="0"/>
+              <a:t>If </a:t>
+            </a:r>
+            <a:r>
+              <a:rPr lang="en-GB" dirty="0" err="1"/>
+              <a:t>KeyVault</a:t>
+            </a:r>
+            <a:r>
+              <a:rPr lang="en-GB" dirty="0"/>
+              <a:t> is ‘Key1’ then rotate ‘Key2’ and update Key Vault with ‘Key2’</a:t>
+            </a:r>
+          </a:p>
+        </p:txBody>
+      </p:sp>
+      <p:sp>
+        <p:nvSpPr>
+          <p:cNvPr id="13" name="Flowchart: Process 12">
+            <a:extLst>
+              <a:ext uri="{FF2B5EF4-FFF2-40B4-BE49-F238E27FC236}">
+                <a16:creationId xmlns:a16="http://schemas.microsoft.com/office/drawing/2014/main" id="{99016A34-C35B-4A90-B768-FE73EDEF7F96}"/>
+              </a:ext>
+            </a:extLst>
+          </p:cNvPr>
+          <p:cNvSpPr/>
+          <p:nvPr/>
+        </p:nvSpPr>
+        <p:spPr>
+          <a:xfrm>
+            <a:off x="3009529" y="5934720"/>
+            <a:ext cx="5734977" cy="790112"/>
+          </a:xfrm>
+          <a:prstGeom prst="flowChartProcess">
+            <a:avLst/>
+          </a:prstGeom>
+        </p:spPr>
+        <p:style>
+          <a:lnRef idx="2">
+            <a:schemeClr val="accent1">
+              <a:shade val="50000"/>
+            </a:schemeClr>
+          </a:lnRef>
+          <a:fillRef idx="1">
+            <a:schemeClr val="accent1"/>
+          </a:fillRef>
+          <a:effectRef idx="0">
+            <a:schemeClr val="accent1"/>
+          </a:effectRef>
+          <a:fontRef idx="minor">
+            <a:schemeClr val="lt1"/>
+          </a:fontRef>
+        </p:style>
+        <p:txBody>
+          <a:bodyPr rtlCol="0" anchor="ctr"/>
+          <a:lstStyle/>
+          <a:p>
+            <a:pPr algn="ctr"/>
+            <a:r>
+              <a:rPr lang="en-GB" dirty="0"/>
+              <a:t>If </a:t>
+            </a:r>
+            <a:r>
+              <a:rPr lang="en-GB" dirty="0" err="1"/>
+              <a:t>KeyVault</a:t>
+            </a:r>
+            <a:r>
+              <a:rPr lang="en-GB" dirty="0"/>
+              <a:t> is ‘Key2’ then rotate ‘Key1’ and update Key Vault with ‘Key1’</a:t>
+            </a:r>
+          </a:p>
+          <a:p>
+            <a:pPr algn="ctr"/>
+            <a:endParaRPr lang="en-GB" dirty="0"/>
+          </a:p>
+        </p:txBody>
+      </p:sp>
+      <p:sp>
+        <p:nvSpPr>
+          <p:cNvPr id="14" name="Arrow: Right 13">
+            <a:extLst>
+              <a:ext uri="{FF2B5EF4-FFF2-40B4-BE49-F238E27FC236}">
+                <a16:creationId xmlns:a16="http://schemas.microsoft.com/office/drawing/2014/main" id="{9DE90B09-2717-4209-9757-B6B03A48DD1F}"/>
+              </a:ext>
+            </a:extLst>
+          </p:cNvPr>
+          <p:cNvSpPr/>
+          <p:nvPr/>
+        </p:nvSpPr>
+        <p:spPr>
+          <a:xfrm>
+            <a:off x="1615736" y="806863"/>
+            <a:ext cx="896645" cy="342781"/>
+          </a:xfrm>
+          <a:prstGeom prst="rightArrow">
+            <a:avLst/>
+          </a:prstGeom>
+        </p:spPr>
+        <p:style>
+          <a:lnRef idx="2">
+            <a:schemeClr val="accent1">
+              <a:shade val="50000"/>
+            </a:schemeClr>
+          </a:lnRef>
+          <a:fillRef idx="1">
+            <a:schemeClr val="accent1"/>
+          </a:fillRef>
+          <a:effectRef idx="0">
+            <a:schemeClr val="accent1"/>
+          </a:effectRef>
+          <a:fontRef idx="minor">
+            <a:schemeClr val="lt1"/>
+          </a:fontRef>
+        </p:style>
+        <p:txBody>
+          <a:bodyPr rtlCol="0" anchor="ctr"/>
+          <a:lstStyle/>
+          <a:p>
+            <a:pPr algn="ctr"/>
+            <a:endParaRPr lang="en-GB"/>
+          </a:p>
+        </p:txBody>
+      </p:sp>
+      <p:sp>
+        <p:nvSpPr>
+          <p:cNvPr id="15" name="Arrow: Right 14">
+            <a:extLst>
+              <a:ext uri="{FF2B5EF4-FFF2-40B4-BE49-F238E27FC236}">
+                <a16:creationId xmlns:a16="http://schemas.microsoft.com/office/drawing/2014/main" id="{0833ED1E-E0EF-4EB8-BFBE-F7525A509D07}"/>
+              </a:ext>
+            </a:extLst>
+          </p:cNvPr>
+          <p:cNvSpPr/>
+          <p:nvPr/>
+        </p:nvSpPr>
+        <p:spPr>
+          <a:xfrm rot="10800000">
+            <a:off x="1615735" y="6282675"/>
+            <a:ext cx="896645" cy="342781"/>
+          </a:xfrm>
+          <a:prstGeom prst="rightArrow">
+            <a:avLst/>
+          </a:prstGeom>
+        </p:spPr>
+        <p:style>
+          <a:lnRef idx="2">
+            <a:schemeClr val="accent1">
+              <a:shade val="50000"/>
+            </a:schemeClr>
+          </a:lnRef>
+          <a:fillRef idx="1">
+            <a:schemeClr val="accent1"/>
+          </a:fillRef>
+          <a:effectRef idx="0">
+            <a:schemeClr val="accent1"/>
+          </a:effectRef>
+          <a:fontRef idx="minor">
+            <a:schemeClr val="lt1"/>
+          </a:fontRef>
+        </p:style>
+        <p:txBody>
+          <a:bodyPr rtlCol="0" anchor="ctr"/>
+          <a:lstStyle/>
+          <a:p>
+            <a:pPr algn="ctr"/>
+            <a:endParaRPr lang="en-GB"/>
+          </a:p>
+        </p:txBody>
+      </p:sp>
+      <p:sp>
+        <p:nvSpPr>
+          <p:cNvPr id="16" name="Rectangle: Rounded Corners 15">
+            <a:extLst>
+              <a:ext uri="{FF2B5EF4-FFF2-40B4-BE49-F238E27FC236}">
+                <a16:creationId xmlns:a16="http://schemas.microsoft.com/office/drawing/2014/main" id="{2862EDC5-9851-47CA-8AEB-54E721F5F165}"/>
+              </a:ext>
+            </a:extLst>
+          </p:cNvPr>
+          <p:cNvSpPr/>
+          <p:nvPr/>
+        </p:nvSpPr>
+        <p:spPr>
+          <a:xfrm>
+            <a:off x="9447413" y="2579825"/>
+            <a:ext cx="2114362" cy="1774061"/>
+          </a:xfrm>
+          <a:prstGeom prst="roundRect">
+            <a:avLst/>
+          </a:prstGeom>
+          <a:noFill/>
+        </p:spPr>
+        <p:style>
+          <a:lnRef idx="2">
+            <a:schemeClr val="accent1">
+              <a:shade val="50000"/>
+            </a:schemeClr>
+          </a:lnRef>
+          <a:fillRef idx="1">
+            <a:schemeClr val="accent1"/>
+          </a:fillRef>
+          <a:effectRef idx="0">
+            <a:schemeClr val="accent1"/>
+          </a:effectRef>
+          <a:fontRef idx="minor">
+            <a:schemeClr val="lt1"/>
+          </a:fontRef>
+        </p:style>
+        <p:txBody>
+          <a:bodyPr rtlCol="0" anchor="ctr"/>
+          <a:lstStyle/>
+          <a:p>
+            <a:pPr algn="ctr"/>
+            <a:endParaRPr lang="en-GB"/>
+          </a:p>
+        </p:txBody>
+      </p:sp>
+      <p:sp>
+        <p:nvSpPr>
+          <p:cNvPr id="17" name="Arrow: Curved Right 16">
+            <a:extLst>
+              <a:ext uri="{FF2B5EF4-FFF2-40B4-BE49-F238E27FC236}">
+                <a16:creationId xmlns:a16="http://schemas.microsoft.com/office/drawing/2014/main" id="{ECC41EF7-A0F5-48E4-AFE4-0C469B135E11}"/>
+              </a:ext>
+            </a:extLst>
+          </p:cNvPr>
+          <p:cNvSpPr/>
+          <p:nvPr/>
+        </p:nvSpPr>
+        <p:spPr>
+          <a:xfrm>
+            <a:off x="1917577" y="2929631"/>
+            <a:ext cx="727969" cy="1305018"/>
+          </a:xfrm>
+          <a:prstGeom prst="curvedRightArrow">
+            <a:avLst/>
+          </a:prstGeom>
+        </p:spPr>
+        <p:style>
+          <a:lnRef idx="2">
+            <a:schemeClr val="accent1">
+              <a:shade val="50000"/>
+            </a:schemeClr>
+          </a:lnRef>
+          <a:fillRef idx="1">
+            <a:schemeClr val="accent1"/>
+          </a:fillRef>
+          <a:effectRef idx="0">
+            <a:schemeClr val="accent1"/>
+          </a:effectRef>
+          <a:fontRef idx="minor">
+            <a:schemeClr val="lt1"/>
+          </a:fontRef>
+        </p:style>
+        <p:txBody>
+          <a:bodyPr rtlCol="0" anchor="ctr"/>
+          <a:lstStyle/>
+          <a:p>
+            <a:pPr algn="ctr"/>
+            <a:endParaRPr lang="en-GB">
+              <a:solidFill>
+                <a:schemeClr val="tx1"/>
+              </a:solidFill>
+            </a:endParaRPr>
+          </a:p>
+        </p:txBody>
+      </p:sp>
+      <p:sp>
+        <p:nvSpPr>
+          <p:cNvPr id="18" name="Arrow: Curved Right 17">
+            <a:extLst>
+              <a:ext uri="{FF2B5EF4-FFF2-40B4-BE49-F238E27FC236}">
+                <a16:creationId xmlns:a16="http://schemas.microsoft.com/office/drawing/2014/main" id="{06E1C123-131B-43DA-AE5F-3E3B829FFD4D}"/>
+              </a:ext>
+            </a:extLst>
+          </p:cNvPr>
+          <p:cNvSpPr/>
+          <p:nvPr/>
+        </p:nvSpPr>
+        <p:spPr>
+          <a:xfrm>
+            <a:off x="1869532" y="4261282"/>
+            <a:ext cx="727969" cy="1305018"/>
+          </a:xfrm>
+          <a:prstGeom prst="curvedRightArrow">
+            <a:avLst/>
+          </a:prstGeom>
+        </p:spPr>
+        <p:style>
+          <a:lnRef idx="2">
+            <a:schemeClr val="accent1">
+              <a:shade val="50000"/>
+            </a:schemeClr>
+          </a:lnRef>
+          <a:fillRef idx="1">
+            <a:schemeClr val="accent1"/>
+          </a:fillRef>
+          <a:effectRef idx="0">
+            <a:schemeClr val="accent1"/>
+          </a:effectRef>
+          <a:fontRef idx="minor">
+            <a:schemeClr val="lt1"/>
+          </a:fontRef>
+        </p:style>
+        <p:txBody>
+          <a:bodyPr rtlCol="0" anchor="ctr"/>
+          <a:lstStyle/>
+          <a:p>
+            <a:pPr algn="ctr"/>
+            <a:endParaRPr lang="en-GB">
+              <a:solidFill>
+                <a:schemeClr val="tx1"/>
+              </a:solidFill>
+            </a:endParaRPr>
+          </a:p>
+        </p:txBody>
+      </p:sp>
+      <p:sp>
+        <p:nvSpPr>
+          <p:cNvPr id="20" name="Arrow: Curved Left 19">
+            <a:extLst>
+              <a:ext uri="{FF2B5EF4-FFF2-40B4-BE49-F238E27FC236}">
+                <a16:creationId xmlns:a16="http://schemas.microsoft.com/office/drawing/2014/main" id="{D14FCBF4-F74F-4C9D-959C-C2DA7EB15ADE}"/>
+              </a:ext>
+            </a:extLst>
+          </p:cNvPr>
+          <p:cNvSpPr/>
+          <p:nvPr/>
+        </p:nvSpPr>
+        <p:spPr>
+          <a:xfrm>
+            <a:off x="8939814" y="4980373"/>
+            <a:ext cx="878889" cy="1402672"/>
+          </a:xfrm>
+          <a:prstGeom prst="curvedLeftArrow">
+            <a:avLst/>
+          </a:prstGeom>
+        </p:spPr>
+        <p:style>
+          <a:lnRef idx="2">
+            <a:schemeClr val="accent1">
+              <a:shade val="50000"/>
+            </a:schemeClr>
+          </a:lnRef>
+          <a:fillRef idx="1">
+            <a:schemeClr val="accent1"/>
+          </a:fillRef>
+          <a:effectRef idx="0">
+            <a:schemeClr val="accent1"/>
+          </a:effectRef>
+          <a:fontRef idx="minor">
+            <a:schemeClr val="lt1"/>
+          </a:fontRef>
+        </p:style>
+        <p:txBody>
+          <a:bodyPr rtlCol="0" anchor="ctr"/>
+          <a:lstStyle/>
+          <a:p>
+            <a:pPr algn="ctr"/>
+            <a:endParaRPr lang="en-GB">
+              <a:solidFill>
+                <a:schemeClr val="tx1"/>
+              </a:solidFill>
+            </a:endParaRPr>
+          </a:p>
+        </p:txBody>
+      </p:sp>
+      <p:sp>
+        <p:nvSpPr>
+          <p:cNvPr id="21" name="TextBox 20">
+            <a:extLst>
+              <a:ext uri="{FF2B5EF4-FFF2-40B4-BE49-F238E27FC236}">
+                <a16:creationId xmlns:a16="http://schemas.microsoft.com/office/drawing/2014/main" id="{E70D2E44-935B-4CD9-849A-66C6CCD305E5}"/>
+              </a:ext>
+            </a:extLst>
+          </p:cNvPr>
+          <p:cNvSpPr txBox="1"/>
+          <p:nvPr/>
+        </p:nvSpPr>
+        <p:spPr>
+          <a:xfrm>
+            <a:off x="484627" y="2744965"/>
+            <a:ext cx="992738" cy="369332"/>
+          </a:xfrm>
+          <a:prstGeom prst="rect">
+            <a:avLst/>
+          </a:prstGeom>
+          <a:noFill/>
+        </p:spPr>
+        <p:txBody>
+          <a:bodyPr wrap="square" rtlCol="0">
+            <a:spAutoFit/>
+          </a:bodyPr>
+          <a:lstStyle/>
+          <a:p>
+            <a:r>
+              <a:rPr lang="en-GB" dirty="0"/>
+              <a:t>Storage</a:t>
+            </a:r>
+          </a:p>
+        </p:txBody>
+      </p:sp>
+      <p:sp>
+        <p:nvSpPr>
+          <p:cNvPr id="22" name="Rectangle: Rounded Corners 21">
+            <a:extLst>
+              <a:ext uri="{FF2B5EF4-FFF2-40B4-BE49-F238E27FC236}">
+                <a16:creationId xmlns:a16="http://schemas.microsoft.com/office/drawing/2014/main" id="{ACEF4AB2-AD39-40B5-9A55-84991F6B0FB5}"/>
+              </a:ext>
+            </a:extLst>
+          </p:cNvPr>
+          <p:cNvSpPr/>
+          <p:nvPr/>
+        </p:nvSpPr>
+        <p:spPr>
+          <a:xfrm>
+            <a:off x="57632" y="2579825"/>
+            <a:ext cx="1734110" cy="1774061"/>
+          </a:xfrm>
+          <a:prstGeom prst="roundRect">
+            <a:avLst/>
+          </a:prstGeom>
+          <a:noFill/>
+        </p:spPr>
+        <p:style>
+          <a:lnRef idx="2">
+            <a:schemeClr val="accent1">
+              <a:shade val="50000"/>
+            </a:schemeClr>
+          </a:lnRef>
+          <a:fillRef idx="1">
+            <a:schemeClr val="accent1"/>
+          </a:fillRef>
+          <a:effectRef idx="0">
+            <a:schemeClr val="accent1"/>
+          </a:effectRef>
+          <a:fontRef idx="minor">
+            <a:schemeClr val="lt1"/>
+          </a:fontRef>
+        </p:style>
+        <p:txBody>
+          <a:bodyPr rtlCol="0" anchor="ctr"/>
+          <a:lstStyle/>
+          <a:p>
+            <a:pPr algn="ctr"/>
+            <a:endParaRPr lang="en-GB"/>
+          </a:p>
+        </p:txBody>
+      </p:sp>
+      <p:pic>
+        <p:nvPicPr>
+          <p:cNvPr id="24" name="Graphic 23">
+            <a:extLst>
+              <a:ext uri="{FF2B5EF4-FFF2-40B4-BE49-F238E27FC236}">
+                <a16:creationId xmlns:a16="http://schemas.microsoft.com/office/drawing/2014/main" id="{4FA9C238-D275-4011-96EB-BC59BA64E306}"/>
+              </a:ext>
+            </a:extLst>
+          </p:cNvPr>
+          <p:cNvPicPr>
+            <a:picLocks noChangeAspect="1"/>
+          </p:cNvPicPr>
+          <p:nvPr/>
+        </p:nvPicPr>
+        <p:blipFill>
+          <a:blip r:embed="rId4">
+            <a:extLst>
+              <a:ext uri="{28A0092B-C50C-407E-A947-70E740481C1C}">
+                <a14:useLocalDpi xmlns:a14="http://schemas.microsoft.com/office/drawing/2010/main" val="0"/>
+              </a:ext>
+              <a:ext uri="{96DAC541-7B7A-43D3-8B79-37D633B846F1}">
+                <asvg:svgBlip xmlns:asvg="http://schemas.microsoft.com/office/drawing/2016/SVG/main" r:embed="rId5"/>
+              </a:ext>
+            </a:extLst>
+          </a:blip>
+          <a:stretch>
+            <a:fillRect/>
+          </a:stretch>
+        </p:blipFill>
+        <p:spPr>
+          <a:xfrm>
+            <a:off x="496516" y="3220552"/>
+            <a:ext cx="905429" cy="905429"/>
+          </a:xfrm>
+          <a:prstGeom prst="rect">
+            <a:avLst/>
+          </a:prstGeom>
+        </p:spPr>
+      </p:pic>
+    </p:spTree>
+    <p:extLst>
+      <p:ext uri="{BB962C8B-B14F-4D97-AF65-F5344CB8AC3E}">
+        <p14:creationId xmlns:p14="http://schemas.microsoft.com/office/powerpoint/2010/main" val="1497519411"/>
+      </p:ext>
+    </p:extLst>
+  </p:cSld>
+  <p:clrMapOvr>
+    <a:masterClrMapping/>
+  </p:clrMapOvr>
+</p:sld>
+</file>
+
 <file path=ppt/theme/theme1.xml><?xml version="1.0" encoding="utf-8"?>
 <a:theme xmlns:a="http://schemas.openxmlformats.org/drawingml/2006/main" name="Office Theme">
   <a:themeElements>

</xml_diff>